<commit_message>
feat: add more data structures and algorithms
</commit_message>
<xml_diff>
--- a/notes/basic/figures.pptx
+++ b/notes/basic/figures.pptx
@@ -7,6 +7,7 @@
   <p:sldIdLst>
     <p:sldId id="256" r:id="rId2"/>
     <p:sldId id="257" r:id="rId3"/>
+    <p:sldId id="258" r:id="rId4"/>
   </p:sldIdLst>
   <p:sldSz cx="12192000" cy="6858000"/>
   <p:notesSz cx="6858000" cy="9144000"/>
@@ -271,7 +272,7 @@
           <a:p>
             <a:fld id="{30F86D06-0C92-45D8-8D91-1C18C237B213}" type="datetimeFigureOut">
               <a:rPr lang="en-US" smtClean="0"/>
-              <a:t>11/24/2022</a:t>
+              <a:t>11/25/2022</a:t>
             </a:fld>
             <a:endParaRPr lang="en-US"/>
           </a:p>
@@ -469,7 +470,7 @@
           <a:p>
             <a:fld id="{30F86D06-0C92-45D8-8D91-1C18C237B213}" type="datetimeFigureOut">
               <a:rPr lang="en-US" smtClean="0"/>
-              <a:t>11/24/2022</a:t>
+              <a:t>11/25/2022</a:t>
             </a:fld>
             <a:endParaRPr lang="en-US"/>
           </a:p>
@@ -677,7 +678,7 @@
           <a:p>
             <a:fld id="{30F86D06-0C92-45D8-8D91-1C18C237B213}" type="datetimeFigureOut">
               <a:rPr lang="en-US" smtClean="0"/>
-              <a:t>11/24/2022</a:t>
+              <a:t>11/25/2022</a:t>
             </a:fld>
             <a:endParaRPr lang="en-US"/>
           </a:p>
@@ -875,7 +876,7 @@
           <a:p>
             <a:fld id="{30F86D06-0C92-45D8-8D91-1C18C237B213}" type="datetimeFigureOut">
               <a:rPr lang="en-US" smtClean="0"/>
-              <a:t>11/24/2022</a:t>
+              <a:t>11/25/2022</a:t>
             </a:fld>
             <a:endParaRPr lang="en-US"/>
           </a:p>
@@ -1150,7 +1151,7 @@
           <a:p>
             <a:fld id="{30F86D06-0C92-45D8-8D91-1C18C237B213}" type="datetimeFigureOut">
               <a:rPr lang="en-US" smtClean="0"/>
-              <a:t>11/24/2022</a:t>
+              <a:t>11/25/2022</a:t>
             </a:fld>
             <a:endParaRPr lang="en-US"/>
           </a:p>
@@ -1415,7 +1416,7 @@
           <a:p>
             <a:fld id="{30F86D06-0C92-45D8-8D91-1C18C237B213}" type="datetimeFigureOut">
               <a:rPr lang="en-US" smtClean="0"/>
-              <a:t>11/24/2022</a:t>
+              <a:t>11/25/2022</a:t>
             </a:fld>
             <a:endParaRPr lang="en-US"/>
           </a:p>
@@ -1827,7 +1828,7 @@
           <a:p>
             <a:fld id="{30F86D06-0C92-45D8-8D91-1C18C237B213}" type="datetimeFigureOut">
               <a:rPr lang="en-US" smtClean="0"/>
-              <a:t>11/24/2022</a:t>
+              <a:t>11/25/2022</a:t>
             </a:fld>
             <a:endParaRPr lang="en-US"/>
           </a:p>
@@ -1968,7 +1969,7 @@
           <a:p>
             <a:fld id="{30F86D06-0C92-45D8-8D91-1C18C237B213}" type="datetimeFigureOut">
               <a:rPr lang="en-US" smtClean="0"/>
-              <a:t>11/24/2022</a:t>
+              <a:t>11/25/2022</a:t>
             </a:fld>
             <a:endParaRPr lang="en-US"/>
           </a:p>
@@ -2081,7 +2082,7 @@
           <a:p>
             <a:fld id="{30F86D06-0C92-45D8-8D91-1C18C237B213}" type="datetimeFigureOut">
               <a:rPr lang="en-US" smtClean="0"/>
-              <a:t>11/24/2022</a:t>
+              <a:t>11/25/2022</a:t>
             </a:fld>
             <a:endParaRPr lang="en-US"/>
           </a:p>
@@ -2392,7 +2393,7 @@
           <a:p>
             <a:fld id="{30F86D06-0C92-45D8-8D91-1C18C237B213}" type="datetimeFigureOut">
               <a:rPr lang="en-US" smtClean="0"/>
-              <a:t>11/24/2022</a:t>
+              <a:t>11/25/2022</a:t>
             </a:fld>
             <a:endParaRPr lang="en-US"/>
           </a:p>
@@ -2680,7 +2681,7 @@
           <a:p>
             <a:fld id="{30F86D06-0C92-45D8-8D91-1C18C237B213}" type="datetimeFigureOut">
               <a:rPr lang="en-US" smtClean="0"/>
-              <a:t>11/24/2022</a:t>
+              <a:t>11/25/2022</a:t>
             </a:fld>
             <a:endParaRPr lang="en-US"/>
           </a:p>
@@ -2921,7 +2922,7 @@
           <a:p>
             <a:fld id="{30F86D06-0C92-45D8-8D91-1C18C237B213}" type="datetimeFigureOut">
               <a:rPr lang="en-US" smtClean="0"/>
-              <a:t>11/24/2022</a:t>
+              <a:t>11/25/2022</a:t>
             </a:fld>
             <a:endParaRPr lang="en-US"/>
           </a:p>
@@ -10051,8 +10052,8 @@
             </p:style>
           </p:cxnSp>
         </p:grpSp>
-        <mc:AlternateContent xmlns:mc="http://schemas.openxmlformats.org/markup-compatibility/2006">
-          <mc:Choice xmlns:a14="http://schemas.microsoft.com/office/drawing/2010/main" Requires="a14">
+        <mc:AlternateContent xmlns:mc="http://schemas.openxmlformats.org/markup-compatibility/2006" xmlns:a14="http://schemas.microsoft.com/office/drawing/2010/main">
+          <mc:Choice Requires="a14">
             <p:sp>
               <p:nvSpPr>
                 <p:cNvPr id="27" name="TextBox 26">
@@ -10081,6 +10082,7 @@
                 </a:bodyPr>
                 <a:lstStyle/>
                 <a:p>
+                  <a:pPr/>
                   <a14:m>
                     <m:oMathPara xmlns:m="http://schemas.openxmlformats.org/officeDocument/2006/math">
                       <m:oMathParaPr>
@@ -10101,7 +10103,7 @@
               </p:txBody>
             </p:sp>
           </mc:Choice>
-          <mc:Fallback>
+          <mc:Fallback xmlns="">
             <p:sp>
               <p:nvSpPr>
                 <p:cNvPr id="27" name="TextBox 26">
@@ -10146,8 +10148,8 @@
             </p:sp>
           </mc:Fallback>
         </mc:AlternateContent>
-        <mc:AlternateContent xmlns:mc="http://schemas.openxmlformats.org/markup-compatibility/2006">
-          <mc:Choice xmlns:a14="http://schemas.microsoft.com/office/drawing/2010/main" Requires="a14">
+        <mc:AlternateContent xmlns:mc="http://schemas.openxmlformats.org/markup-compatibility/2006" xmlns:a14="http://schemas.microsoft.com/office/drawing/2010/main">
+          <mc:Choice Requires="a14">
             <p:sp>
               <p:nvSpPr>
                 <p:cNvPr id="28" name="TextBox 27">
@@ -10176,6 +10178,7 @@
                 </a:bodyPr>
                 <a:lstStyle/>
                 <a:p>
+                  <a:pPr/>
                   <a14:m>
                     <m:oMathPara xmlns:m="http://schemas.openxmlformats.org/officeDocument/2006/math">
                       <m:oMathParaPr>
@@ -10208,7 +10211,7 @@
               </p:txBody>
             </p:sp>
           </mc:Choice>
-          <mc:Fallback>
+          <mc:Fallback xmlns="">
             <p:sp>
               <p:nvSpPr>
                 <p:cNvPr id="28" name="TextBox 27">
@@ -10253,8 +10256,8 @@
             </p:sp>
           </mc:Fallback>
         </mc:AlternateContent>
-        <mc:AlternateContent xmlns:mc="http://schemas.openxmlformats.org/markup-compatibility/2006">
-          <mc:Choice xmlns:a14="http://schemas.microsoft.com/office/drawing/2010/main" Requires="a14">
+        <mc:AlternateContent xmlns:mc="http://schemas.openxmlformats.org/markup-compatibility/2006" xmlns:a14="http://schemas.microsoft.com/office/drawing/2010/main">
+          <mc:Choice Requires="a14">
             <p:sp>
               <p:nvSpPr>
                 <p:cNvPr id="29" name="TextBox 28">
@@ -10283,6 +10286,7 @@
                 </a:bodyPr>
                 <a:lstStyle/>
                 <a:p>
+                  <a:pPr/>
                   <a14:m>
                     <m:oMathPara xmlns:m="http://schemas.openxmlformats.org/officeDocument/2006/math">
                       <m:oMathParaPr>
@@ -10309,7 +10313,7 @@
               </p:txBody>
             </p:sp>
           </mc:Choice>
-          <mc:Fallback>
+          <mc:Fallback xmlns="">
             <p:sp>
               <p:nvSpPr>
                 <p:cNvPr id="29" name="TextBox 28">
@@ -10354,8 +10358,8 @@
             </p:sp>
           </mc:Fallback>
         </mc:AlternateContent>
-        <mc:AlternateContent xmlns:mc="http://schemas.openxmlformats.org/markup-compatibility/2006">
-          <mc:Choice xmlns:a14="http://schemas.microsoft.com/office/drawing/2010/main" Requires="a14">
+        <mc:AlternateContent xmlns:mc="http://schemas.openxmlformats.org/markup-compatibility/2006" xmlns:a14="http://schemas.microsoft.com/office/drawing/2010/main">
+          <mc:Choice Requires="a14">
             <p:sp>
               <p:nvSpPr>
                 <p:cNvPr id="30" name="TextBox 29">
@@ -10384,6 +10388,7 @@
                 </a:bodyPr>
                 <a:lstStyle/>
                 <a:p>
+                  <a:pPr/>
                   <a14:m>
                     <m:oMathPara xmlns:m="http://schemas.openxmlformats.org/officeDocument/2006/math">
                       <m:oMathParaPr>
@@ -10404,7 +10409,7 @@
               </p:txBody>
             </p:sp>
           </mc:Choice>
-          <mc:Fallback>
+          <mc:Fallback xmlns="">
             <p:sp>
               <p:nvSpPr>
                 <p:cNvPr id="30" name="TextBox 29">
@@ -10766,8 +10771,8 @@
           </a:p>
         </p:txBody>
       </p:sp>
-      <mc:AlternateContent xmlns:mc="http://schemas.openxmlformats.org/markup-compatibility/2006">
-        <mc:Choice xmlns:a14="http://schemas.microsoft.com/office/drawing/2010/main" Requires="a14">
+      <mc:AlternateContent xmlns:mc="http://schemas.openxmlformats.org/markup-compatibility/2006" xmlns:a14="http://schemas.microsoft.com/office/drawing/2010/main">
+        <mc:Choice Requires="a14">
           <p:sp>
             <p:nvSpPr>
               <p:cNvPr id="49" name="TextBox 48">
@@ -10823,7 +10828,7 @@
             </p:txBody>
           </p:sp>
         </mc:Choice>
-        <mc:Fallback>
+        <mc:Fallback xmlns="">
           <p:sp>
             <p:nvSpPr>
               <p:cNvPr id="49" name="TextBox 48">
@@ -10868,8 +10873,8 @@
           </p:sp>
         </mc:Fallback>
       </mc:AlternateContent>
-      <mc:AlternateContent xmlns:mc="http://schemas.openxmlformats.org/markup-compatibility/2006">
-        <mc:Choice xmlns:a14="http://schemas.microsoft.com/office/drawing/2010/main" Requires="a14">
+      <mc:AlternateContent xmlns:mc="http://schemas.openxmlformats.org/markup-compatibility/2006" xmlns:a14="http://schemas.microsoft.com/office/drawing/2010/main">
+        <mc:Choice Requires="a14">
           <p:sp>
             <p:nvSpPr>
               <p:cNvPr id="50" name="TextBox 49">
@@ -10919,7 +10924,7 @@
             </p:txBody>
           </p:sp>
         </mc:Choice>
-        <mc:Fallback>
+        <mc:Fallback xmlns="">
           <p:sp>
             <p:nvSpPr>
               <p:cNvPr id="50" name="TextBox 49">
@@ -10964,8 +10969,8 @@
           </p:sp>
         </mc:Fallback>
       </mc:AlternateContent>
-      <mc:AlternateContent xmlns:mc="http://schemas.openxmlformats.org/markup-compatibility/2006">
-        <mc:Choice xmlns:a14="http://schemas.microsoft.com/office/drawing/2010/main" Requires="a14">
+      <mc:AlternateContent xmlns:mc="http://schemas.openxmlformats.org/markup-compatibility/2006" xmlns:a14="http://schemas.microsoft.com/office/drawing/2010/main">
+        <mc:Choice Requires="a14">
           <p:sp>
             <p:nvSpPr>
               <p:cNvPr id="52" name="TextBox 51">
@@ -11015,7 +11020,7 @@
             </p:txBody>
           </p:sp>
         </mc:Choice>
-        <mc:Fallback>
+        <mc:Fallback xmlns="">
           <p:sp>
             <p:nvSpPr>
               <p:cNvPr id="52" name="TextBox 51">
@@ -11060,8 +11065,8 @@
           </p:sp>
         </mc:Fallback>
       </mc:AlternateContent>
-      <mc:AlternateContent xmlns:mc="http://schemas.openxmlformats.org/markup-compatibility/2006">
-        <mc:Choice xmlns:a14="http://schemas.microsoft.com/office/drawing/2010/main" Requires="a14">
+      <mc:AlternateContent xmlns:mc="http://schemas.openxmlformats.org/markup-compatibility/2006" xmlns:a14="http://schemas.microsoft.com/office/drawing/2010/main">
+        <mc:Choice Requires="a14">
           <p:sp>
             <p:nvSpPr>
               <p:cNvPr id="53" name="TextBox 52">
@@ -11117,7 +11122,7 @@
             </p:txBody>
           </p:sp>
         </mc:Choice>
-        <mc:Fallback>
+        <mc:Fallback xmlns="">
           <p:sp>
             <p:nvSpPr>
               <p:cNvPr id="53" name="TextBox 52">
@@ -11166,6 +11171,88 @@
     <p:extLst>
       <p:ext uri="{BB962C8B-B14F-4D97-AF65-F5344CB8AC3E}">
         <p14:creationId xmlns:p14="http://schemas.microsoft.com/office/powerpoint/2010/main" val="3352134637"/>
+      </p:ext>
+    </p:extLst>
+  </p:cSld>
+  <p:clrMapOvr>
+    <a:masterClrMapping/>
+  </p:clrMapOvr>
+</p:sld>
+</file>
+
+<file path=ppt/slides/slide3.xml><?xml version="1.0" encoding="utf-8"?>
+<p:sld xmlns:a="http://schemas.openxmlformats.org/drawingml/2006/main" xmlns:r="http://schemas.openxmlformats.org/officeDocument/2006/relationships" xmlns:p="http://schemas.openxmlformats.org/presentationml/2006/main">
+  <p:cSld>
+    <p:spTree>
+      <p:nvGrpSpPr>
+        <p:cNvPr id="1" name=""/>
+        <p:cNvGrpSpPr/>
+        <p:nvPr/>
+      </p:nvGrpSpPr>
+      <p:grpSpPr>
+        <a:xfrm>
+          <a:off x="0" y="0"/>
+          <a:ext cx="0" cy="0"/>
+          <a:chOff x="0" y="0"/>
+          <a:chExt cx="0" cy="0"/>
+        </a:xfrm>
+      </p:grpSpPr>
+      <p:sp>
+        <p:nvSpPr>
+          <p:cNvPr id="2" name="Oval 1">
+            <a:extLst>
+              <a:ext uri="{FF2B5EF4-FFF2-40B4-BE49-F238E27FC236}">
+                <a16:creationId xmlns:a16="http://schemas.microsoft.com/office/drawing/2014/main" id="{873DD34E-39D1-D553-B466-40E778791F6D}"/>
+              </a:ext>
+            </a:extLst>
+          </p:cNvPr>
+          <p:cNvSpPr/>
+          <p:nvPr/>
+        </p:nvSpPr>
+        <p:spPr>
+          <a:xfrm>
+            <a:off x="1879600" y="1130300"/>
+            <a:ext cx="488950" cy="488950"/>
+          </a:xfrm>
+          <a:prstGeom prst="ellipse">
+            <a:avLst/>
+          </a:prstGeom>
+          <a:noFill/>
+          <a:ln w="19050">
+            <a:solidFill>
+              <a:schemeClr val="tx1"/>
+            </a:solidFill>
+          </a:ln>
+        </p:spPr>
+        <p:style>
+          <a:lnRef idx="2">
+            <a:schemeClr val="accent1">
+              <a:shade val="50000"/>
+            </a:schemeClr>
+          </a:lnRef>
+          <a:fillRef idx="1">
+            <a:schemeClr val="accent1"/>
+          </a:fillRef>
+          <a:effectRef idx="0">
+            <a:schemeClr val="accent1"/>
+          </a:effectRef>
+          <a:fontRef idx="minor">
+            <a:schemeClr val="lt1"/>
+          </a:fontRef>
+        </p:style>
+        <p:txBody>
+          <a:bodyPr rtlCol="0" anchor="ctr"/>
+          <a:lstStyle/>
+          <a:p>
+            <a:pPr algn="ctr"/>
+            <a:endParaRPr lang="en-US"/>
+          </a:p>
+        </p:txBody>
+      </p:sp>
+    </p:spTree>
+    <p:extLst>
+      <p:ext uri="{BB962C8B-B14F-4D97-AF65-F5344CB8AC3E}">
+        <p14:creationId xmlns:p14="http://schemas.microsoft.com/office/powerpoint/2010/main" val="4130009713"/>
       </p:ext>
     </p:extLst>
   </p:cSld>

</xml_diff>